<commit_message>
add key file and update JPA-Hibernate.pptx
</commit_message>
<xml_diff>
--- a/ppt/JPA-Hibernate.pptx
+++ b/ppt/JPA-Hibernate.pptx
@@ -28,6 +28,8 @@
     <p:sldId id="273" r:id="rId25"/>
     <p:sldId id="274" r:id="rId26"/>
     <p:sldId id="275" r:id="rId27"/>
+    <p:sldId id="276" r:id="rId28"/>
+    <p:sldId id="277" r:id="rId29"/>
   </p:sldIdLst>
   <p:sldSz cx="24384000" cy="13716000"/>
   <p:notesSz cx="6858000" cy="9144000"/>
@@ -7694,8 +7696,8 @@
       </p:par>
     </p:tnLst>
     <p:bldLst>
+      <p:bldP build="whole" bldLvl="1" animBg="1" rev="0" advAuto="0" spid="242" grpId="2"/>
       <p:bldP build="whole" bldLvl="1" animBg="1" rev="0" advAuto="0" spid="241" grpId="1"/>
-      <p:bldP build="whole" bldLvl="1" animBg="1" rev="0" advAuto="0" spid="242" grpId="2"/>
     </p:bldLst>
   </p:timing>
 </p:sld>
@@ -8843,6 +8845,222 @@
           </a:p>
         </p:txBody>
       </p:sp>
+    </p:spTree>
+  </p:cSld>
+  <p:clrMapOvr>
+    <a:masterClrMapping/>
+  </p:clrMapOvr>
+  <p:transition xmlns:p14="http://schemas.microsoft.com/office/powerpoint/2010/main" spd="med" advClick="1"/>
+</p:sld>
+</file>
+
+<file path=ppt/slides/slide21.xml><?xml version="1.0" encoding="utf-8"?>
+<p:sld xmlns:a="http://schemas.openxmlformats.org/drawingml/2006/main" xmlns:r="http://schemas.openxmlformats.org/officeDocument/2006/relationships" xmlns:p="http://schemas.openxmlformats.org/presentationml/2006/main" xmlns:m="http://schemas.openxmlformats.org/officeDocument/2006/math" xmlns:a14="http://schemas.microsoft.com/office/drawing/2010/main" showMasterSp="1" showMasterPhAnim="1">
+  <p:cSld>
+    <p:spTree>
+      <p:nvGrpSpPr>
+        <p:cNvPr id="1" name=""/>
+        <p:cNvGrpSpPr/>
+        <p:nvPr/>
+      </p:nvGrpSpPr>
+      <p:grpSpPr>
+        <a:xfrm>
+          <a:off x="0" y="0"/>
+          <a:ext cx="0" cy="0"/>
+          <a:chOff x="0" y="0"/>
+          <a:chExt cx="0" cy="0"/>
+        </a:xfrm>
+      </p:grpSpPr>
+      <p:sp>
+        <p:nvSpPr>
+          <p:cNvPr id="262" name="JPQL Syntax"/>
+          <p:cNvSpPr txBox="1"/>
+          <p:nvPr>
+            <p:ph type="title"/>
+          </p:nvPr>
+        </p:nvSpPr>
+        <p:spPr>
+          <a:prstGeom prst="rect">
+            <a:avLst/>
+          </a:prstGeom>
+        </p:spPr>
+        <p:txBody>
+          <a:bodyPr/>
+          <a:lstStyle>
+            <a:lvl1pPr defTabSz="2316421">
+              <a:defRPr spc="-95" sz="9500"/>
+            </a:lvl1pPr>
+          </a:lstStyle>
+          <a:p>
+            <a:pPr/>
+            <a:r>
+              <a:t>JPQL Syntax</a:t>
+            </a:r>
+          </a:p>
+        </p:txBody>
+      </p:sp>
+      <p:sp>
+        <p:nvSpPr>
+          <p:cNvPr id="263" name="Java Persist Query Language"/>
+          <p:cNvSpPr txBox="1"/>
+          <p:nvPr>
+            <p:ph type="body" idx="21"/>
+          </p:nvPr>
+        </p:nvSpPr>
+        <p:spPr>
+          <a:prstGeom prst="rect">
+            <a:avLst/>
+          </a:prstGeom>
+          <a:extLst>
+            <a:ext uri="{C572A759-6A51-4108-AA02-DFA0A04FC94B}">
+              <ma14:wrappingTextBoxFlag xmlns:ma14="http://schemas.microsoft.com/office/mac/drawingml/2011/main" val="1"/>
+            </a:ext>
+          </a:extLst>
+        </p:spPr>
+        <p:txBody>
+          <a:bodyPr/>
+          <a:lstStyle/>
+          <a:p>
+            <a:pPr/>
+            <a:r>
+              <a:t>Java Persist Query Language</a:t>
+            </a:r>
+          </a:p>
+        </p:txBody>
+      </p:sp>
+      <p:pic>
+        <p:nvPicPr>
+          <p:cNvPr id="264" name="pasted-movie.png" descr="pasted-movie.png"/>
+          <p:cNvPicPr>
+            <a:picLocks noChangeAspect="1"/>
+          </p:cNvPicPr>
+          <p:nvPr/>
+        </p:nvPicPr>
+        <p:blipFill>
+          <a:blip r:embed="rId2">
+            <a:extLst/>
+          </a:blip>
+          <a:stretch>
+            <a:fillRect/>
+          </a:stretch>
+        </p:blipFill>
+        <p:spPr>
+          <a:xfrm>
+            <a:off x="4678036" y="4805648"/>
+            <a:ext cx="15027928" cy="7140600"/>
+          </a:xfrm>
+          <a:prstGeom prst="rect">
+            <a:avLst/>
+          </a:prstGeom>
+          <a:ln w="12700">
+            <a:miter lim="400000"/>
+          </a:ln>
+        </p:spPr>
+      </p:pic>
+    </p:spTree>
+  </p:cSld>
+  <p:clrMapOvr>
+    <a:masterClrMapping/>
+  </p:clrMapOvr>
+  <p:transition xmlns:p14="http://schemas.microsoft.com/office/powerpoint/2010/main" spd="med" advClick="1"/>
+</p:sld>
+</file>
+
+<file path=ppt/slides/slide22.xml><?xml version="1.0" encoding="utf-8"?>
+<p:sld xmlns:a="http://schemas.openxmlformats.org/drawingml/2006/main" xmlns:r="http://schemas.openxmlformats.org/officeDocument/2006/relationships" xmlns:p="http://schemas.openxmlformats.org/presentationml/2006/main" xmlns:m="http://schemas.openxmlformats.org/officeDocument/2006/math" xmlns:a14="http://schemas.microsoft.com/office/drawing/2010/main" showMasterSp="1" showMasterPhAnim="1">
+  <p:cSld>
+    <p:spTree>
+      <p:nvGrpSpPr>
+        <p:cNvPr id="1" name=""/>
+        <p:cNvGrpSpPr/>
+        <p:nvPr/>
+      </p:nvGrpSpPr>
+      <p:grpSpPr>
+        <a:xfrm>
+          <a:off x="0" y="0"/>
+          <a:ext cx="0" cy="0"/>
+          <a:chOff x="0" y="0"/>
+          <a:chExt cx="0" cy="0"/>
+        </a:xfrm>
+      </p:grpSpPr>
+      <p:sp>
+        <p:nvSpPr>
+          <p:cNvPr id="266" name="Entity Lifecycle"/>
+          <p:cNvSpPr txBox="1"/>
+          <p:nvPr>
+            <p:ph type="title"/>
+          </p:nvPr>
+        </p:nvSpPr>
+        <p:spPr>
+          <a:prstGeom prst="rect">
+            <a:avLst/>
+          </a:prstGeom>
+        </p:spPr>
+        <p:txBody>
+          <a:bodyPr/>
+          <a:lstStyle>
+            <a:lvl1pPr defTabSz="2316421">
+              <a:defRPr spc="-95" sz="9500"/>
+            </a:lvl1pPr>
+          </a:lstStyle>
+          <a:p>
+            <a:pPr/>
+            <a:r>
+              <a:t>Entity Lifecycle</a:t>
+            </a:r>
+          </a:p>
+        </p:txBody>
+      </p:sp>
+      <p:sp>
+        <p:nvSpPr>
+          <p:cNvPr id="267" name="Slide Subtitle"/>
+          <p:cNvSpPr txBox="1"/>
+          <p:nvPr>
+            <p:ph type="body" idx="21"/>
+          </p:nvPr>
+        </p:nvSpPr>
+        <p:spPr>
+          <a:prstGeom prst="rect">
+            <a:avLst/>
+          </a:prstGeom>
+        </p:spPr>
+        <p:txBody>
+          <a:bodyPr/>
+          <a:lstStyle/>
+          <a:p>
+            <a:pPr/>
+          </a:p>
+        </p:txBody>
+      </p:sp>
+      <p:pic>
+        <p:nvPicPr>
+          <p:cNvPr id="268" name="pasted-movie.png" descr="pasted-movie.png"/>
+          <p:cNvPicPr>
+            <a:picLocks noChangeAspect="1"/>
+          </p:cNvPicPr>
+          <p:nvPr/>
+        </p:nvPicPr>
+        <p:blipFill>
+          <a:blip r:embed="rId2">
+            <a:extLst/>
+          </a:blip>
+          <a:stretch>
+            <a:fillRect/>
+          </a:stretch>
+        </p:blipFill>
+        <p:spPr>
+          <a:xfrm>
+            <a:off x="5771356" y="3316188"/>
+            <a:ext cx="12841346" cy="10119449"/>
+          </a:xfrm>
+          <a:prstGeom prst="rect">
+            <a:avLst/>
+          </a:prstGeom>
+          <a:ln w="12700">
+            <a:miter lim="400000"/>
+          </a:ln>
+        </p:spPr>
+      </p:pic>
     </p:spTree>
   </p:cSld>
   <p:clrMapOvr>
@@ -13605,8 +13823,8 @@
       </p:par>
     </p:tnLst>
     <p:bldLst>
+      <p:bldP build="p" bldLvl="5" animBg="1" rev="0" advAuto="0" spid="196" grpId="2"/>
       <p:bldP build="p" bldLvl="5" animBg="1" rev="0" advAuto="0" spid="198" grpId="1"/>
-      <p:bldP build="p" bldLvl="5" animBg="1" rev="0" advAuto="0" spid="196" grpId="2"/>
       <p:bldP build="p" bldLvl="5" animBg="1" rev="0" advAuto="0" spid="198" grpId="3"/>
     </p:bldLst>
   </p:timing>

</xml_diff>

<commit_message>
update ppt and key files add reference in toc to jpql named query project
</commit_message>
<xml_diff>
--- a/ppt/JPA-Hibernate.pptx
+++ b/ppt/JPA-Hibernate.pptx
@@ -7696,8 +7696,8 @@
       </p:par>
     </p:tnLst>
     <p:bldLst>
+      <p:bldP build="whole" bldLvl="1" animBg="1" rev="0" advAuto="0" spid="241" grpId="1"/>
       <p:bldP build="whole" bldLvl="1" animBg="1" rev="0" advAuto="0" spid="242" grpId="2"/>
-      <p:bldP build="whole" bldLvl="1" animBg="1" rev="0" advAuto="0" spid="241" grpId="1"/>
     </p:bldLst>
   </p:timing>
 </p:sld>
@@ -9044,14 +9044,15 @@
           <a:blip r:embed="rId2">
             <a:extLst/>
           </a:blip>
+          <a:srcRect l="0" t="0" r="0" b="0"/>
           <a:stretch>
             <a:fillRect/>
           </a:stretch>
         </p:blipFill>
         <p:spPr>
           <a:xfrm>
-            <a:off x="5771356" y="3316188"/>
-            <a:ext cx="12841346" cy="10119449"/>
+            <a:off x="5690195" y="3229074"/>
+            <a:ext cx="13003484" cy="10293714"/>
           </a:xfrm>
           <a:prstGeom prst="rect">
             <a:avLst/>
@@ -13823,8 +13824,8 @@
       </p:par>
     </p:tnLst>
     <p:bldLst>
+      <p:bldP build="p" bldLvl="5" animBg="1" rev="0" advAuto="0" spid="198" grpId="1"/>
       <p:bldP build="p" bldLvl="5" animBg="1" rev="0" advAuto="0" spid="196" grpId="2"/>
-      <p:bldP build="p" bldLvl="5" animBg="1" rev="0" advAuto="0" spid="198" grpId="1"/>
       <p:bldP build="p" bldLvl="5" animBg="1" rev="0" advAuto="0" spid="198" grpId="3"/>
     </p:bldLst>
   </p:timing>

</xml_diff>